<commit_message>
Update slide deck 1
</commit_message>
<xml_diff>
--- a/01-intro.pptx
+++ b/01-intro.pptx
@@ -282,7 +282,7 @@
               <a:rPr lang="en-US" smtClean="0">
                 <a:latin typeface="Segoe UI" pitchFamily="34" charset="0"/>
               </a:rPr>
-              <a:t>5/19/2021 7:05 PM</a:t>
+              <a:t>10/17/2021 12:53 PM</a:t>
             </a:fld>
             <a:endParaRPr lang="en-US" dirty="0">
               <a:latin typeface="Segoe UI" pitchFamily="34" charset="0"/>
@@ -579,7 +579,7 @@
           <a:p>
             <a:fld id="{D18B56EA-E28F-4F92-9F16-7A6F2501B303}" type="datetime8">
               <a:rPr lang="en-US" smtClean="0"/>
-              <a:t>5/19/2021 7:05 PM</a:t>
+              <a:t>10/17/2021 12:53 PM</a:t>
             </a:fld>
             <a:endParaRPr lang="en-US" dirty="0"/>
           </a:p>
@@ -962,7 +962,7 @@
           <a:p>
             <a:fld id="{D18B56EA-E28F-4F92-9F16-7A6F2501B303}" type="datetime8">
               <a:rPr lang="en-US" smtClean="0"/>
-              <a:t>5/19/2021 7:05 PM</a:t>
+              <a:t>10/17/2021 12:53 PM</a:t>
             </a:fld>
             <a:endParaRPr lang="en-US" dirty="0"/>
           </a:p>
@@ -1600,6 +1600,23 @@
             </a:r>
           </a:p>
           <a:p>
+            <a:pPr marL="0" marR="0" lvl="0" indent="0" algn="l" defTabSz="932742" rtl="0" eaLnBrk="1" fontAlgn="auto" latinLnBrk="0" hangingPunct="1">
+              <a:lnSpc>
+                <a:spcPct val="90000"/>
+              </a:lnSpc>
+              <a:spcBef>
+                <a:spcPts val="0"/>
+              </a:spcBef>
+              <a:spcAft>
+                <a:spcPts val="340"/>
+              </a:spcAft>
+              <a:buClrTx/>
+              <a:buSzTx/>
+              <a:buFontTx/>
+              <a:buNone/>
+              <a:tabLst/>
+              <a:defRPr/>
+            </a:pPr>
             <a:r>
               <a:rPr lang="en-US" sz="900" b="0" kern="1200" dirty="0">
                 <a:solidFill>
@@ -1634,8 +1651,47 @@
                 <a:ea typeface="+mn-ea"/>
                 <a:cs typeface="+mn-cs"/>
               </a:rPr>
-              <a:t>: The serve task will start the local web server that hosts the local workbench.</a:t>
-            </a:r>
+              <a:t>: </a:t>
+            </a:r>
+            <a:r>
+              <a:rPr lang="en-US" b="0" dirty="0">
+                <a:solidFill>
+                  <a:srgbClr val="000000"/>
+                </a:solidFill>
+                <a:effectLst/>
+                <a:latin typeface="Consolas" panose="020B0609020204030204" pitchFamily="49" charset="0"/>
+              </a:rPr>
+              <a:t>The serve task will </a:t>
+            </a:r>
+            <a:r>
+              <a:rPr lang="en-US" b="0" dirty="0" err="1">
+                <a:solidFill>
+                  <a:srgbClr val="000000"/>
+                </a:solidFill>
+                <a:effectLst/>
+                <a:latin typeface="Consolas" panose="020B0609020204030204" pitchFamily="49" charset="0"/>
+              </a:rPr>
+              <a:t>will</a:t>
+            </a:r>
+            <a:r>
+              <a:rPr lang="en-US" b="0" dirty="0">
+                <a:solidFill>
+                  <a:srgbClr val="000000"/>
+                </a:solidFill>
+                <a:effectLst/>
+                <a:latin typeface="Consolas" panose="020B0609020204030204" pitchFamily="49" charset="0"/>
+              </a:rPr>
+              <a:t> build the project and start the local web server.</a:t>
+            </a:r>
+            <a:endParaRPr lang="en-US" sz="900" b="0" kern="1200" dirty="0">
+              <a:solidFill>
+                <a:schemeClr val="tx1"/>
+              </a:solidFill>
+              <a:effectLst/>
+              <a:latin typeface="Segoe UI Light" pitchFamily="34" charset="0"/>
+              <a:ea typeface="+mn-ea"/>
+              <a:cs typeface="+mn-cs"/>
+            </a:endParaRPr>
           </a:p>
           <a:p>
             <a:r>
@@ -1954,7 +2010,7 @@
           <a:p>
             <a:fld id="{D18B56EA-E28F-4F92-9F16-7A6F2501B303}" type="datetime8">
               <a:rPr lang="en-US" smtClean="0"/>
-              <a:t>5/19/2021 7:05 PM</a:t>
+              <a:t>10/17/2021 12:53 PM</a:t>
             </a:fld>
             <a:endParaRPr lang="en-US" dirty="0"/>
           </a:p>
@@ -2732,7 +2788,7 @@
           <a:p>
             <a:fld id="{D18B56EA-E28F-4F92-9F16-7A6F2501B303}" type="datetime8">
               <a:rPr lang="en-US" smtClean="0"/>
-              <a:t>5/19/2021 7:05 PM</a:t>
+              <a:t>10/17/2021 12:53 PM</a:t>
             </a:fld>
             <a:endParaRPr lang="en-US" dirty="0"/>
           </a:p>
@@ -2913,7 +2969,7 @@
           <a:p>
             <a:fld id="{D18B56EA-E28F-4F92-9F16-7A6F2501B303}" type="datetime8">
               <a:rPr lang="en-US" smtClean="0"/>
-              <a:t>5/19/2021 7:05 PM</a:t>
+              <a:t>10/17/2021 12:53 PM</a:t>
             </a:fld>
             <a:endParaRPr lang="en-US" dirty="0"/>
           </a:p>
@@ -3094,7 +3150,7 @@
           <a:p>
             <a:fld id="{D18B56EA-E28F-4F92-9F16-7A6F2501B303}" type="datetime8">
               <a:rPr lang="en-US" smtClean="0"/>
-              <a:t>5/19/2021 7:05 PM</a:t>
+              <a:t>10/17/2021 12:53 PM</a:t>
             </a:fld>
             <a:endParaRPr lang="en-US" dirty="0"/>
           </a:p>
@@ -3275,7 +3331,7 @@
           <a:p>
             <a:fld id="{D18B56EA-E28F-4F92-9F16-7A6F2501B303}" type="datetime8">
               <a:rPr lang="en-US" smtClean="0"/>
-              <a:t>5/19/2021 7:05 PM</a:t>
+              <a:t>10/17/2021 12:53 PM</a:t>
             </a:fld>
             <a:endParaRPr lang="en-US" dirty="0"/>
           </a:p>
@@ -3456,7 +3512,7 @@
           <a:p>
             <a:fld id="{D18B56EA-E28F-4F92-9F16-7A6F2501B303}" type="datetime8">
               <a:rPr lang="en-US" smtClean="0"/>
-              <a:t>5/19/2021 7:05 PM</a:t>
+              <a:t>10/17/2021 12:53 PM</a:t>
             </a:fld>
             <a:endParaRPr lang="en-US" dirty="0"/>
           </a:p>
@@ -3640,7 +3696,7 @@
           <a:p>
             <a:fld id="{D18B56EA-E28F-4F92-9F16-7A6F2501B303}" type="datetime8">
               <a:rPr lang="en-US" smtClean="0"/>
-              <a:t>5/19/2021 7:05 PM</a:t>
+              <a:t>10/17/2021 12:53 PM</a:t>
             </a:fld>
             <a:endParaRPr lang="en-US" dirty="0"/>
           </a:p>
@@ -4836,7 +4892,7 @@
           <a:p>
             <a:fld id="{D18B56EA-E28F-4F92-9F16-7A6F2501B303}" type="datetime8">
               <a:rPr lang="en-US" smtClean="0"/>
-              <a:t>5/19/2021 7:05 PM</a:t>
+              <a:t>10/17/2021 12:53 PM</a:t>
             </a:fld>
             <a:endParaRPr lang="en-US" dirty="0"/>
           </a:p>
@@ -5421,16 +5477,7 @@
           <a:p>
             <a:r>
               <a:rPr lang="en-US" dirty="0"/>
-              <a:t>Moving onto the second column, test your component in the local or hosted workbench by executing the command `gulp serve` from the command line from the root folder of the project. This task will build, bundle, start the local web server, launch the default browser, and navigate to the local workbench. Here you can add your web part to the local workbench's page to test it.</a:t>
-            </a:r>
-          </a:p>
-          <a:p>
-            <a:endParaRPr lang="en-US" dirty="0"/>
-          </a:p>
-          <a:p>
-            <a:r>
-              <a:rPr lang="en-US" dirty="0"/>
-              <a:t>You can also test it in the hosted workbench by using the same browser and navigating to the hosted workbench. The hosted workbench will load the component from your local web server in the browser.</a:t>
+              <a:t>Moving onto the second column, test your component in the hosted workbench by executing the command `gulp serve` from the command line from the root folder of the project. This task will build, bundle, start the local web server, launch the default browser, and navigate to the workbench. Here you can add your web part to the workbench's page to test it. The hosted workbench will load the component from your local web server in the browser.</a:t>
             </a:r>
           </a:p>
           <a:p>
@@ -5564,7 +5611,7 @@
           <a:p>
             <a:fld id="{D18B56EA-E28F-4F92-9F16-7A6F2501B303}" type="datetime8">
               <a:rPr lang="en-US" smtClean="0"/>
-              <a:t>5/19/2021 7:05 PM</a:t>
+              <a:t>10/17/2021 12:53 PM</a:t>
             </a:fld>
             <a:endParaRPr lang="en-US" dirty="0"/>
           </a:p>
@@ -25308,7 +25355,7 @@
                   <a:lin ang="5400000" scaled="1"/>
                 </a:gradFill>
               </a:rPr>
-              <a:t>Local or Hosted</a:t>
+              <a:t>Hosted</a:t>
             </a:r>
           </a:p>
         </p:txBody>
@@ -26186,7 +26233,7 @@
           <a:lstStyle/>
           <a:p>
             <a:r>
-              <a:rPr lang="en-US" sz="1100">
+              <a:rPr lang="en-US" sz="1100" dirty="0">
                 <a:gradFill>
                   <a:gsLst>
                     <a:gs pos="1250">

</xml_diff>